<commit_message>
update all and add new lecture 3
</commit_message>
<xml_diff>
--- a/lecture_03.pptx
+++ b/lecture_03.pptx
@@ -466,7 +466,7 @@
             <a:fld id="{D74C362C-B8EB-FD47-9516-07D42DF4EB3B}" type="datetimeFigureOut">
               <a:rPr lang="en-US" smtClean="0"/>
               <a:pPr/>
-              <a:t>11/14/22</a:t>
+              <a:t>4/5/23</a:t>
             </a:fld>
             <a:endParaRPr lang="en-US" dirty="0"/>
           </a:p>
@@ -634,7 +634,7 @@
             <a:fld id="{C4A2F74A-12B1-374E-80C1-2FDEFD7DEBF6}" type="datetimeFigureOut">
               <a:rPr lang="en-US" smtClean="0"/>
               <a:pPr/>
-              <a:t>11/14/22</a:t>
+              <a:t>4/5/23</a:t>
             </a:fld>
             <a:endParaRPr lang="en-US" dirty="0"/>
           </a:p>
@@ -951,6 +951,758 @@
           <a:p>
             <a:r>
               <a:rPr lang="en-US" dirty="0"/>
+              <a:t>Make data the most prominent thing about the chart</a:t>
+            </a:r>
+          </a:p>
+        </p:txBody>
+      </p:sp>
+      <p:sp>
+        <p:nvSpPr>
+          <p:cNvPr id="4" name="Slide Number Placeholder 3"/>
+          <p:cNvSpPr>
+            <a:spLocks noGrp="1"/>
+          </p:cNvSpPr>
+          <p:nvPr>
+            <p:ph type="sldNum" sz="quarter" idx="5"/>
+          </p:nvPr>
+        </p:nvSpPr>
+        <p:spPr/>
+        <p:txBody>
+          <a:bodyPr/>
+          <a:lstStyle/>
+          <a:p>
+            <a:fld id="{321CD387-5C10-F04B-A125-F0EA107DEF46}" type="slidenum">
+              <a:rPr lang="en-US" smtClean="0"/>
+              <a:pPr/>
+              <a:t>5</a:t>
+            </a:fld>
+            <a:endParaRPr lang="en-US" dirty="0"/>
+          </a:p>
+        </p:txBody>
+      </p:sp>
+    </p:spTree>
+    <p:extLst>
+      <p:ext uri="{BB962C8B-B14F-4D97-AF65-F5344CB8AC3E}">
+        <p14:creationId xmlns:p14="http://schemas.microsoft.com/office/powerpoint/2010/main" val="3422040130"/>
+      </p:ext>
+    </p:extLst>
+  </p:cSld>
+  <p:clrMapOvr>
+    <a:masterClrMapping/>
+  </p:clrMapOvr>
+</p:notes>
+</file>
+
+<file path=ppt/notesSlides/notesSlide2.xml><?xml version="1.0" encoding="utf-8"?>
+<p:notes xmlns:a="http://schemas.openxmlformats.org/drawingml/2006/main" xmlns:r="http://schemas.openxmlformats.org/officeDocument/2006/relationships" xmlns:p="http://schemas.openxmlformats.org/presentationml/2006/main">
+  <p:cSld>
+    <p:spTree>
+      <p:nvGrpSpPr>
+        <p:cNvPr id="1" name=""/>
+        <p:cNvGrpSpPr/>
+        <p:nvPr/>
+      </p:nvGrpSpPr>
+      <p:grpSpPr>
+        <a:xfrm>
+          <a:off x="0" y="0"/>
+          <a:ext cx="0" cy="0"/>
+          <a:chOff x="0" y="0"/>
+          <a:chExt cx="0" cy="0"/>
+        </a:xfrm>
+      </p:grpSpPr>
+      <p:sp>
+        <p:nvSpPr>
+          <p:cNvPr id="2" name="Slide Image Placeholder 1"/>
+          <p:cNvSpPr>
+            <a:spLocks noGrp="1" noRot="1" noChangeAspect="1"/>
+          </p:cNvSpPr>
+          <p:nvPr>
+            <p:ph type="sldImg"/>
+          </p:nvPr>
+        </p:nvSpPr>
+        <p:spPr/>
+      </p:sp>
+      <p:sp>
+        <p:nvSpPr>
+          <p:cNvPr id="3" name="Notes Placeholder 2"/>
+          <p:cNvSpPr>
+            <a:spLocks noGrp="1"/>
+          </p:cNvSpPr>
+          <p:nvPr>
+            <p:ph type="body" idx="1"/>
+          </p:nvPr>
+        </p:nvSpPr>
+        <p:spPr/>
+        <p:txBody>
+          <a:bodyPr/>
+          <a:lstStyle/>
+          <a:p>
+            <a:r>
+              <a:rPr lang="en-US" dirty="0"/>
+              <a:t>How we perceive and distinguish between groups of things.</a:t>
+            </a:r>
+          </a:p>
+        </p:txBody>
+      </p:sp>
+      <p:sp>
+        <p:nvSpPr>
+          <p:cNvPr id="4" name="Slide Number Placeholder 3"/>
+          <p:cNvSpPr>
+            <a:spLocks noGrp="1"/>
+          </p:cNvSpPr>
+          <p:nvPr>
+            <p:ph type="sldNum" sz="quarter" idx="5"/>
+          </p:nvPr>
+        </p:nvSpPr>
+        <p:spPr/>
+        <p:txBody>
+          <a:bodyPr/>
+          <a:lstStyle/>
+          <a:p>
+            <a:fld id="{321CD387-5C10-F04B-A125-F0EA107DEF46}" type="slidenum">
+              <a:rPr lang="en-US" smtClean="0"/>
+              <a:pPr/>
+              <a:t>12</a:t>
+            </a:fld>
+            <a:endParaRPr lang="en-US" dirty="0"/>
+          </a:p>
+        </p:txBody>
+      </p:sp>
+    </p:spTree>
+    <p:extLst>
+      <p:ext uri="{BB962C8B-B14F-4D97-AF65-F5344CB8AC3E}">
+        <p14:creationId xmlns:p14="http://schemas.microsoft.com/office/powerpoint/2010/main" val="3588473187"/>
+      </p:ext>
+    </p:extLst>
+  </p:cSld>
+  <p:clrMapOvr>
+    <a:masterClrMapping/>
+  </p:clrMapOvr>
+</p:notes>
+</file>
+
+<file path=ppt/notesSlides/notesSlide3.xml><?xml version="1.0" encoding="utf-8"?>
+<p:notes xmlns:a="http://schemas.openxmlformats.org/drawingml/2006/main" xmlns:r="http://schemas.openxmlformats.org/officeDocument/2006/relationships" xmlns:p="http://schemas.openxmlformats.org/presentationml/2006/main">
+  <p:cSld>
+    <p:spTree>
+      <p:nvGrpSpPr>
+        <p:cNvPr id="1" name=""/>
+        <p:cNvGrpSpPr/>
+        <p:nvPr/>
+      </p:nvGrpSpPr>
+      <p:grpSpPr>
+        <a:xfrm>
+          <a:off x="0" y="0"/>
+          <a:ext cx="0" cy="0"/>
+          <a:chOff x="0" y="0"/>
+          <a:chExt cx="0" cy="0"/>
+        </a:xfrm>
+      </p:grpSpPr>
+      <p:sp>
+        <p:nvSpPr>
+          <p:cNvPr id="2" name="Slide Image Placeholder 1"/>
+          <p:cNvSpPr>
+            <a:spLocks noGrp="1" noRot="1" noChangeAspect="1"/>
+          </p:cNvSpPr>
+          <p:nvPr>
+            <p:ph type="sldImg"/>
+          </p:nvPr>
+        </p:nvSpPr>
+        <p:spPr/>
+      </p:sp>
+      <p:sp>
+        <p:nvSpPr>
+          <p:cNvPr id="3" name="Notes Placeholder 2"/>
+          <p:cNvSpPr>
+            <a:spLocks noGrp="1"/>
+          </p:cNvSpPr>
+          <p:nvPr>
+            <p:ph type="body" idx="1"/>
+          </p:nvPr>
+        </p:nvSpPr>
+        <p:spPr/>
+        <p:txBody>
+          <a:bodyPr/>
+          <a:lstStyle/>
+          <a:p>
+            <a:pPr marL="0" marR="0" lvl="0" indent="0" algn="l" defTabSz="457200" rtl="0" eaLnBrk="1" fontAlgn="auto" latinLnBrk="0" hangingPunct="1">
+              <a:lnSpc>
+                <a:spcPct val="100000"/>
+              </a:lnSpc>
+              <a:spcBef>
+                <a:spcPts val="0"/>
+              </a:spcBef>
+              <a:spcAft>
+                <a:spcPts val="0"/>
+              </a:spcAft>
+              <a:buClrTx/>
+              <a:buSzTx/>
+              <a:buFontTx/>
+              <a:buNone/>
+              <a:tabLst/>
+              <a:defRPr/>
+            </a:pPr>
+            <a:r>
+              <a:rPr lang="en-US" dirty="0"/>
+              <a:t>Will walk through how they should be used</a:t>
+            </a:r>
+          </a:p>
+          <a:p>
+            <a:endParaRPr lang="en-US" dirty="0"/>
+          </a:p>
+        </p:txBody>
+      </p:sp>
+      <p:sp>
+        <p:nvSpPr>
+          <p:cNvPr id="4" name="Slide Number Placeholder 3"/>
+          <p:cNvSpPr>
+            <a:spLocks noGrp="1"/>
+          </p:cNvSpPr>
+          <p:nvPr>
+            <p:ph type="sldNum" sz="quarter" idx="5"/>
+          </p:nvPr>
+        </p:nvSpPr>
+        <p:spPr/>
+        <p:txBody>
+          <a:bodyPr/>
+          <a:lstStyle/>
+          <a:p>
+            <a:fld id="{321CD387-5C10-F04B-A125-F0EA107DEF46}" type="slidenum">
+              <a:rPr lang="en-US" smtClean="0"/>
+              <a:pPr/>
+              <a:t>13</a:t>
+            </a:fld>
+            <a:endParaRPr lang="en-US" dirty="0"/>
+          </a:p>
+        </p:txBody>
+      </p:sp>
+    </p:spTree>
+    <p:extLst>
+      <p:ext uri="{BB962C8B-B14F-4D97-AF65-F5344CB8AC3E}">
+        <p14:creationId xmlns:p14="http://schemas.microsoft.com/office/powerpoint/2010/main" val="3954064536"/>
+      </p:ext>
+    </p:extLst>
+  </p:cSld>
+  <p:clrMapOvr>
+    <a:masterClrMapping/>
+  </p:clrMapOvr>
+</p:notes>
+</file>
+
+<file path=ppt/notesSlides/notesSlide4.xml><?xml version="1.0" encoding="utf-8"?>
+<p:notes xmlns:a="http://schemas.openxmlformats.org/drawingml/2006/main" xmlns:r="http://schemas.openxmlformats.org/officeDocument/2006/relationships" xmlns:p="http://schemas.openxmlformats.org/presentationml/2006/main">
+  <p:cSld>
+    <p:spTree>
+      <p:nvGrpSpPr>
+        <p:cNvPr id="1" name=""/>
+        <p:cNvGrpSpPr/>
+        <p:nvPr/>
+      </p:nvGrpSpPr>
+      <p:grpSpPr>
+        <a:xfrm>
+          <a:off x="0" y="0"/>
+          <a:ext cx="0" cy="0"/>
+          <a:chOff x="0" y="0"/>
+          <a:chExt cx="0" cy="0"/>
+        </a:xfrm>
+      </p:grpSpPr>
+      <p:sp>
+        <p:nvSpPr>
+          <p:cNvPr id="2" name="Slide Image Placeholder 1"/>
+          <p:cNvSpPr>
+            <a:spLocks noGrp="1" noRot="1" noChangeAspect="1"/>
+          </p:cNvSpPr>
+          <p:nvPr>
+            <p:ph type="sldImg"/>
+          </p:nvPr>
+        </p:nvSpPr>
+        <p:spPr/>
+      </p:sp>
+      <p:sp>
+        <p:nvSpPr>
+          <p:cNvPr id="3" name="Notes Placeholder 2"/>
+          <p:cNvSpPr>
+            <a:spLocks noGrp="1"/>
+          </p:cNvSpPr>
+          <p:nvPr>
+            <p:ph type="body" idx="1"/>
+          </p:nvPr>
+        </p:nvSpPr>
+        <p:spPr/>
+        <p:txBody>
+          <a:bodyPr/>
+          <a:lstStyle/>
+          <a:p>
+            <a:r>
+              <a:rPr lang="en-US" dirty="0"/>
+              <a:t>Proximity is why scatter plots work.</a:t>
+            </a:r>
+          </a:p>
+        </p:txBody>
+      </p:sp>
+      <p:sp>
+        <p:nvSpPr>
+          <p:cNvPr id="4" name="Slide Number Placeholder 3"/>
+          <p:cNvSpPr>
+            <a:spLocks noGrp="1"/>
+          </p:cNvSpPr>
+          <p:nvPr>
+            <p:ph type="sldNum" sz="quarter" idx="5"/>
+          </p:nvPr>
+        </p:nvSpPr>
+        <p:spPr/>
+        <p:txBody>
+          <a:bodyPr/>
+          <a:lstStyle/>
+          <a:p>
+            <a:fld id="{321CD387-5C10-F04B-A125-F0EA107DEF46}" type="slidenum">
+              <a:rPr lang="en-US" smtClean="0"/>
+              <a:pPr/>
+              <a:t>14</a:t>
+            </a:fld>
+            <a:endParaRPr lang="en-US" dirty="0"/>
+          </a:p>
+        </p:txBody>
+      </p:sp>
+    </p:spTree>
+    <p:extLst>
+      <p:ext uri="{BB962C8B-B14F-4D97-AF65-F5344CB8AC3E}">
+        <p14:creationId xmlns:p14="http://schemas.microsoft.com/office/powerpoint/2010/main" val="2053789288"/>
+      </p:ext>
+    </p:extLst>
+  </p:cSld>
+  <p:clrMapOvr>
+    <a:masterClrMapping/>
+  </p:clrMapOvr>
+</p:notes>
+</file>
+
+<file path=ppt/notesSlides/notesSlide5.xml><?xml version="1.0" encoding="utf-8"?>
+<p:notes xmlns:a="http://schemas.openxmlformats.org/drawingml/2006/main" xmlns:r="http://schemas.openxmlformats.org/officeDocument/2006/relationships" xmlns:p="http://schemas.openxmlformats.org/presentationml/2006/main">
+  <p:cSld>
+    <p:spTree>
+      <p:nvGrpSpPr>
+        <p:cNvPr id="1" name=""/>
+        <p:cNvGrpSpPr/>
+        <p:nvPr/>
+      </p:nvGrpSpPr>
+      <p:grpSpPr>
+        <a:xfrm>
+          <a:off x="0" y="0"/>
+          <a:ext cx="0" cy="0"/>
+          <a:chOff x="0" y="0"/>
+          <a:chExt cx="0" cy="0"/>
+        </a:xfrm>
+      </p:grpSpPr>
+      <p:sp>
+        <p:nvSpPr>
+          <p:cNvPr id="2" name="Slide Image Placeholder 1"/>
+          <p:cNvSpPr>
+            <a:spLocks noGrp="1" noRot="1" noChangeAspect="1"/>
+          </p:cNvSpPr>
+          <p:nvPr>
+            <p:ph type="sldImg"/>
+          </p:nvPr>
+        </p:nvSpPr>
+        <p:spPr/>
+      </p:sp>
+      <p:sp>
+        <p:nvSpPr>
+          <p:cNvPr id="3" name="Notes Placeholder 2"/>
+          <p:cNvSpPr>
+            <a:spLocks noGrp="1"/>
+          </p:cNvSpPr>
+          <p:nvPr>
+            <p:ph type="body" idx="1"/>
+          </p:nvPr>
+        </p:nvSpPr>
+        <p:spPr/>
+        <p:txBody>
+          <a:bodyPr/>
+          <a:lstStyle/>
+          <a:p>
+            <a:r>
+              <a:rPr lang="en-US" dirty="0"/>
+              <a:t>Color and saturation are the two that get used most often</a:t>
+            </a:r>
+          </a:p>
+        </p:txBody>
+      </p:sp>
+      <p:sp>
+        <p:nvSpPr>
+          <p:cNvPr id="4" name="Slide Number Placeholder 3"/>
+          <p:cNvSpPr>
+            <a:spLocks noGrp="1"/>
+          </p:cNvSpPr>
+          <p:nvPr>
+            <p:ph type="sldNum" sz="quarter" idx="5"/>
+          </p:nvPr>
+        </p:nvSpPr>
+        <p:spPr/>
+        <p:txBody>
+          <a:bodyPr/>
+          <a:lstStyle/>
+          <a:p>
+            <a:fld id="{321CD387-5C10-F04B-A125-F0EA107DEF46}" type="slidenum">
+              <a:rPr lang="en-US" smtClean="0"/>
+              <a:pPr/>
+              <a:t>15</a:t>
+            </a:fld>
+            <a:endParaRPr lang="en-US" dirty="0"/>
+          </a:p>
+        </p:txBody>
+      </p:sp>
+    </p:spTree>
+    <p:extLst>
+      <p:ext uri="{BB962C8B-B14F-4D97-AF65-F5344CB8AC3E}">
+        <p14:creationId xmlns:p14="http://schemas.microsoft.com/office/powerpoint/2010/main" val="2851076685"/>
+      </p:ext>
+    </p:extLst>
+  </p:cSld>
+  <p:clrMapOvr>
+    <a:masterClrMapping/>
+  </p:clrMapOvr>
+</p:notes>
+</file>
+
+<file path=ppt/notesSlides/notesSlide6.xml><?xml version="1.0" encoding="utf-8"?>
+<p:notes xmlns:a="http://schemas.openxmlformats.org/drawingml/2006/main" xmlns:r="http://schemas.openxmlformats.org/officeDocument/2006/relationships" xmlns:p="http://schemas.openxmlformats.org/presentationml/2006/main">
+  <p:cSld>
+    <p:spTree>
+      <p:nvGrpSpPr>
+        <p:cNvPr id="1" name=""/>
+        <p:cNvGrpSpPr/>
+        <p:nvPr/>
+      </p:nvGrpSpPr>
+      <p:grpSpPr>
+        <a:xfrm>
+          <a:off x="0" y="0"/>
+          <a:ext cx="0" cy="0"/>
+          <a:chOff x="0" y="0"/>
+          <a:chExt cx="0" cy="0"/>
+        </a:xfrm>
+      </p:grpSpPr>
+      <p:sp>
+        <p:nvSpPr>
+          <p:cNvPr id="2" name="Slide Image Placeholder 1"/>
+          <p:cNvSpPr>
+            <a:spLocks noGrp="1" noRot="1" noChangeAspect="1"/>
+          </p:cNvSpPr>
+          <p:nvPr>
+            <p:ph type="sldImg"/>
+          </p:nvPr>
+        </p:nvSpPr>
+        <p:spPr/>
+      </p:sp>
+      <p:sp>
+        <p:nvSpPr>
+          <p:cNvPr id="3" name="Notes Placeholder 2"/>
+          <p:cNvSpPr>
+            <a:spLocks noGrp="1"/>
+          </p:cNvSpPr>
+          <p:nvPr>
+            <p:ph type="body" idx="1"/>
+          </p:nvPr>
+        </p:nvSpPr>
+        <p:spPr/>
+        <p:txBody>
+          <a:bodyPr/>
+          <a:lstStyle/>
+          <a:p>
+            <a:r>
+              <a:rPr lang="en-US" dirty="0"/>
+              <a:t>Most often done with call out boxes</a:t>
+            </a:r>
+          </a:p>
+          <a:p>
+            <a:r>
+              <a:rPr lang="en-US" dirty="0"/>
+              <a:t>Overrides the gestalt of position in this example.</a:t>
+            </a:r>
+          </a:p>
+          <a:p>
+            <a:r>
+              <a:rPr lang="en-US" dirty="0"/>
+              <a:t>Often used to add emphasis or draw attention</a:t>
+            </a:r>
+          </a:p>
+        </p:txBody>
+      </p:sp>
+      <p:sp>
+        <p:nvSpPr>
+          <p:cNvPr id="4" name="Slide Number Placeholder 3"/>
+          <p:cNvSpPr>
+            <a:spLocks noGrp="1"/>
+          </p:cNvSpPr>
+          <p:nvPr>
+            <p:ph type="sldNum" sz="quarter" idx="5"/>
+          </p:nvPr>
+        </p:nvSpPr>
+        <p:spPr/>
+        <p:txBody>
+          <a:bodyPr/>
+          <a:lstStyle/>
+          <a:p>
+            <a:fld id="{321CD387-5C10-F04B-A125-F0EA107DEF46}" type="slidenum">
+              <a:rPr lang="en-US" smtClean="0"/>
+              <a:pPr/>
+              <a:t>17</a:t>
+            </a:fld>
+            <a:endParaRPr lang="en-US" dirty="0"/>
+          </a:p>
+        </p:txBody>
+      </p:sp>
+    </p:spTree>
+    <p:extLst>
+      <p:ext uri="{BB962C8B-B14F-4D97-AF65-F5344CB8AC3E}">
+        <p14:creationId xmlns:p14="http://schemas.microsoft.com/office/powerpoint/2010/main" val="3250816299"/>
+      </p:ext>
+    </p:extLst>
+  </p:cSld>
+  <p:clrMapOvr>
+    <a:masterClrMapping/>
+  </p:clrMapOvr>
+</p:notes>
+</file>
+
+<file path=ppt/notesSlides/notesSlide7.xml><?xml version="1.0" encoding="utf-8"?>
+<p:notes xmlns:a="http://schemas.openxmlformats.org/drawingml/2006/main" xmlns:r="http://schemas.openxmlformats.org/officeDocument/2006/relationships" xmlns:p="http://schemas.openxmlformats.org/presentationml/2006/main">
+  <p:cSld>
+    <p:spTree>
+      <p:nvGrpSpPr>
+        <p:cNvPr id="1" name=""/>
+        <p:cNvGrpSpPr/>
+        <p:nvPr/>
+      </p:nvGrpSpPr>
+      <p:grpSpPr>
+        <a:xfrm>
+          <a:off x="0" y="0"/>
+          <a:ext cx="0" cy="0"/>
+          <a:chOff x="0" y="0"/>
+          <a:chExt cx="0" cy="0"/>
+        </a:xfrm>
+      </p:grpSpPr>
+      <p:sp>
+        <p:nvSpPr>
+          <p:cNvPr id="2" name="Slide Image Placeholder 1"/>
+          <p:cNvSpPr>
+            <a:spLocks noGrp="1" noRot="1" noChangeAspect="1"/>
+          </p:cNvSpPr>
+          <p:nvPr>
+            <p:ph type="sldImg"/>
+          </p:nvPr>
+        </p:nvSpPr>
+        <p:spPr/>
+      </p:sp>
+      <p:sp>
+        <p:nvSpPr>
+          <p:cNvPr id="3" name="Notes Placeholder 2"/>
+          <p:cNvSpPr>
+            <a:spLocks noGrp="1"/>
+          </p:cNvSpPr>
+          <p:nvPr>
+            <p:ph type="body" idx="1"/>
+          </p:nvPr>
+        </p:nvSpPr>
+        <p:spPr/>
+        <p:txBody>
+          <a:bodyPr/>
+          <a:lstStyle/>
+          <a:p>
+            <a:r>
+              <a:rPr lang="en-US" dirty="0"/>
+              <a:t>Again overrides position</a:t>
+            </a:r>
+          </a:p>
+          <a:p>
+            <a:r>
+              <a:rPr lang="en-US" dirty="0"/>
+              <a:t>Also used in line charts to communicate connection between points</a:t>
+            </a:r>
+          </a:p>
+        </p:txBody>
+      </p:sp>
+      <p:sp>
+        <p:nvSpPr>
+          <p:cNvPr id="4" name="Slide Number Placeholder 3"/>
+          <p:cNvSpPr>
+            <a:spLocks noGrp="1"/>
+          </p:cNvSpPr>
+          <p:nvPr>
+            <p:ph type="sldNum" sz="quarter" idx="5"/>
+          </p:nvPr>
+        </p:nvSpPr>
+        <p:spPr/>
+        <p:txBody>
+          <a:bodyPr/>
+          <a:lstStyle/>
+          <a:p>
+            <a:fld id="{321CD387-5C10-F04B-A125-F0EA107DEF46}" type="slidenum">
+              <a:rPr lang="en-US" smtClean="0"/>
+              <a:pPr/>
+              <a:t>19</a:t>
+            </a:fld>
+            <a:endParaRPr lang="en-US" dirty="0"/>
+          </a:p>
+        </p:txBody>
+      </p:sp>
+    </p:spTree>
+    <p:extLst>
+      <p:ext uri="{BB962C8B-B14F-4D97-AF65-F5344CB8AC3E}">
+        <p14:creationId xmlns:p14="http://schemas.microsoft.com/office/powerpoint/2010/main" val="3045169577"/>
+      </p:ext>
+    </p:extLst>
+  </p:cSld>
+  <p:clrMapOvr>
+    <a:masterClrMapping/>
+  </p:clrMapOvr>
+</p:notes>
+</file>
+
+<file path=ppt/notesSlides/notesSlide8.xml><?xml version="1.0" encoding="utf-8"?>
+<p:notes xmlns:a="http://schemas.openxmlformats.org/drawingml/2006/main" xmlns:r="http://schemas.openxmlformats.org/officeDocument/2006/relationships" xmlns:p="http://schemas.openxmlformats.org/presentationml/2006/main">
+  <p:cSld>
+    <p:spTree>
+      <p:nvGrpSpPr>
+        <p:cNvPr id="1" name=""/>
+        <p:cNvGrpSpPr/>
+        <p:nvPr/>
+      </p:nvGrpSpPr>
+      <p:grpSpPr>
+        <a:xfrm>
+          <a:off x="0" y="0"/>
+          <a:ext cx="0" cy="0"/>
+          <a:chOff x="0" y="0"/>
+          <a:chExt cx="0" cy="0"/>
+        </a:xfrm>
+      </p:grpSpPr>
+      <p:sp>
+        <p:nvSpPr>
+          <p:cNvPr id="2" name="Slide Image Placeholder 1"/>
+          <p:cNvSpPr>
+            <a:spLocks noGrp="1" noRot="1" noChangeAspect="1"/>
+          </p:cNvSpPr>
+          <p:nvPr>
+            <p:ph type="sldImg"/>
+          </p:nvPr>
+        </p:nvSpPr>
+        <p:spPr/>
+      </p:sp>
+      <p:sp>
+        <p:nvSpPr>
+          <p:cNvPr id="3" name="Notes Placeholder 2"/>
+          <p:cNvSpPr>
+            <a:spLocks noGrp="1"/>
+          </p:cNvSpPr>
+          <p:nvPr>
+            <p:ph type="body" idx="1"/>
+          </p:nvPr>
+        </p:nvSpPr>
+        <p:spPr/>
+        <p:txBody>
+          <a:bodyPr/>
+          <a:lstStyle/>
+          <a:p>
+            <a:r>
+              <a:rPr lang="en-US" dirty="0"/>
+              <a:t>The only time this wouldn’t be better would be for a chart with dates</a:t>
+            </a:r>
+          </a:p>
+          <a:p>
+            <a:r>
+              <a:rPr lang="en-US" dirty="0" err="1"/>
+              <a:t>Inthose</a:t>
+            </a:r>
+            <a:r>
+              <a:rPr lang="en-US" dirty="0"/>
+              <a:t> cases, just eliminate some of the labels</a:t>
+            </a:r>
+          </a:p>
+        </p:txBody>
+      </p:sp>
+      <p:sp>
+        <p:nvSpPr>
+          <p:cNvPr id="4" name="Slide Number Placeholder 3"/>
+          <p:cNvSpPr>
+            <a:spLocks noGrp="1"/>
+          </p:cNvSpPr>
+          <p:nvPr>
+            <p:ph type="sldNum" sz="quarter" idx="5"/>
+          </p:nvPr>
+        </p:nvSpPr>
+        <p:spPr/>
+        <p:txBody>
+          <a:bodyPr/>
+          <a:lstStyle/>
+          <a:p>
+            <a:fld id="{321CD387-5C10-F04B-A125-F0EA107DEF46}" type="slidenum">
+              <a:rPr lang="en-US" smtClean="0"/>
+              <a:pPr/>
+              <a:t>25</a:t>
+            </a:fld>
+            <a:endParaRPr lang="en-US" dirty="0"/>
+          </a:p>
+        </p:txBody>
+      </p:sp>
+    </p:spTree>
+    <p:extLst>
+      <p:ext uri="{BB962C8B-B14F-4D97-AF65-F5344CB8AC3E}">
+        <p14:creationId xmlns:p14="http://schemas.microsoft.com/office/powerpoint/2010/main" val="2519855405"/>
+      </p:ext>
+    </p:extLst>
+  </p:cSld>
+  <p:clrMapOvr>
+    <a:masterClrMapping/>
+  </p:clrMapOvr>
+</p:notes>
+</file>
+
+<file path=ppt/notesSlides/notesSlide9.xml><?xml version="1.0" encoding="utf-8"?>
+<p:notes xmlns:a="http://schemas.openxmlformats.org/drawingml/2006/main" xmlns:r="http://schemas.openxmlformats.org/officeDocument/2006/relationships" xmlns:p="http://schemas.openxmlformats.org/presentationml/2006/main">
+  <p:cSld>
+    <p:spTree>
+      <p:nvGrpSpPr>
+        <p:cNvPr id="1" name=""/>
+        <p:cNvGrpSpPr/>
+        <p:nvPr/>
+      </p:nvGrpSpPr>
+      <p:grpSpPr>
+        <a:xfrm>
+          <a:off x="0" y="0"/>
+          <a:ext cx="0" cy="0"/>
+          <a:chOff x="0" y="0"/>
+          <a:chExt cx="0" cy="0"/>
+        </a:xfrm>
+      </p:grpSpPr>
+      <p:sp>
+        <p:nvSpPr>
+          <p:cNvPr id="2" name="Slide Image Placeholder 1"/>
+          <p:cNvSpPr>
+            <a:spLocks noGrp="1" noRot="1" noChangeAspect="1"/>
+          </p:cNvSpPr>
+          <p:nvPr>
+            <p:ph type="sldImg"/>
+          </p:nvPr>
+        </p:nvSpPr>
+        <p:spPr/>
+      </p:sp>
+      <p:sp>
+        <p:nvSpPr>
+          <p:cNvPr id="3" name="Notes Placeholder 2"/>
+          <p:cNvSpPr>
+            <a:spLocks noGrp="1"/>
+          </p:cNvSpPr>
+          <p:nvPr>
+            <p:ph type="body" idx="1"/>
+          </p:nvPr>
+        </p:nvSpPr>
+        <p:spPr/>
+        <p:txBody>
+          <a:bodyPr/>
+          <a:lstStyle/>
+          <a:p>
+            <a:r>
+              <a:rPr lang="en-US" dirty="0"/>
               <a:t>Contrast is something like added color, bold, adding lines. Is used to get people’s attention and focus.</a:t>
             </a:r>
           </a:p>
@@ -1183,7 +1935,7 @@
             <a:fld id="{BF2120F1-9931-5144-8579-2441D6C0DD32}" type="datetime1">
               <a:rPr lang="en-US" smtClean="0"/>
               <a:pPr/>
-              <a:t>11/14/22</a:t>
+              <a:t>4/5/23</a:t>
             </a:fld>
             <a:endParaRPr lang="en-US" dirty="0"/>
           </a:p>
@@ -1356,7 +2108,7 @@
             <a:fld id="{CCBA9B1B-521F-F040-A936-9C24B7C3F03A}" type="datetime1">
               <a:rPr lang="en-US" smtClean="0"/>
               <a:pPr/>
-              <a:t>11/14/22</a:t>
+              <a:t>4/5/23</a:t>
             </a:fld>
             <a:endParaRPr lang="en-US" dirty="0"/>
           </a:p>
@@ -1531,7 +2283,7 @@
             <a:fld id="{48A00697-3A82-494B-A2A9-9056C0181C76}" type="datetime1">
               <a:rPr lang="en-US" smtClean="0"/>
               <a:pPr/>
-              <a:t>11/14/22</a:t>
+              <a:t>4/5/23</a:t>
             </a:fld>
             <a:endParaRPr lang="en-US" dirty="0"/>
           </a:p>
@@ -1696,7 +2448,7 @@
             <a:fld id="{EED28DF4-C6BF-7F42-B138-795ED59850A4}" type="datetime1">
               <a:rPr lang="en-US" smtClean="0"/>
               <a:pPr/>
-              <a:t>11/14/22</a:t>
+              <a:t>4/5/23</a:t>
             </a:fld>
             <a:endParaRPr lang="en-US" dirty="0"/>
           </a:p>
@@ -1938,7 +2690,7 @@
             <a:fld id="{532AA17B-7185-6C44-A552-058DC86AD96F}" type="datetime1">
               <a:rPr lang="en-US" smtClean="0"/>
               <a:pPr/>
-              <a:t>11/14/22</a:t>
+              <a:t>4/5/23</a:t>
             </a:fld>
             <a:endParaRPr lang="en-US" dirty="0"/>
           </a:p>
@@ -2220,7 +2972,7 @@
             <a:fld id="{A2DFB613-38D3-1149-A0A4-2A57BFB6831E}" type="datetime1">
               <a:rPr lang="en-US" smtClean="0"/>
               <a:pPr/>
-              <a:t>11/14/22</a:t>
+              <a:t>4/5/23</a:t>
             </a:fld>
             <a:endParaRPr lang="en-US" dirty="0"/>
           </a:p>
@@ -2636,7 +3388,7 @@
             <a:fld id="{C091352F-42AA-1A4A-BD42-9B228A48C236}" type="datetime1">
               <a:rPr lang="en-US" smtClean="0"/>
               <a:pPr/>
-              <a:t>11/14/22</a:t>
+              <a:t>4/5/23</a:t>
             </a:fld>
             <a:endParaRPr lang="en-US" dirty="0"/>
           </a:p>
@@ -2750,7 +3502,7 @@
             <a:fld id="{2CEB281E-5358-9348-B9AE-FA8A5F98086C}" type="datetime1">
               <a:rPr lang="en-US" smtClean="0"/>
               <a:pPr/>
-              <a:t>11/14/22</a:t>
+              <a:t>4/5/23</a:t>
             </a:fld>
             <a:endParaRPr lang="en-US" dirty="0"/>
           </a:p>
@@ -2842,7 +3594,7 @@
             <a:fld id="{DE613C27-B94C-214A-AD40-E117D03A6D82}" type="datetime1">
               <a:rPr lang="en-US" smtClean="0"/>
               <a:pPr/>
-              <a:t>11/14/22</a:t>
+              <a:t>4/5/23</a:t>
             </a:fld>
             <a:endParaRPr lang="en-US" dirty="0"/>
           </a:p>
@@ -3114,7 +3866,7 @@
             <a:fld id="{9321218D-3333-E24A-A5A0-456EBB6100E7}" type="datetime1">
               <a:rPr lang="en-US" smtClean="0"/>
               <a:pPr/>
-              <a:t>11/14/22</a:t>
+              <a:t>4/5/23</a:t>
             </a:fld>
             <a:endParaRPr lang="en-US" dirty="0"/>
           </a:p>
@@ -3363,7 +4115,7 @@
             <a:fld id="{8AD4A7FE-19C1-714A-BBBC-D934D8657335}" type="datetime1">
               <a:rPr lang="en-US" smtClean="0"/>
               <a:pPr/>
-              <a:t>11/14/22</a:t>
+              <a:t>4/5/23</a:t>
             </a:fld>
             <a:endParaRPr lang="en-US" dirty="0"/>
           </a:p>
@@ -3571,7 +4323,7 @@
             <a:fld id="{9F9391EC-ACC5-D54E-8D06-C2561D95A2AA}" type="datetime1">
               <a:rPr lang="en-US" smtClean="0"/>
               <a:pPr/>
-              <a:t>11/14/22</a:t>
+              <a:t>4/5/23</a:t>
             </a:fld>
             <a:endParaRPr lang="en-US" dirty="0"/>
           </a:p>
@@ -4515,7 +5267,7 @@
             </a:r>
             <a:r>
               <a:rPr lang="en-US" sz="1000">
-                <a:hlinkClick r:id="rId2"/>
+                <a:hlinkClick r:id="rId3"/>
               </a:rPr>
               <a:t>http://www.scholarpedia.org/article/Gestalt_principles</a:t>
             </a:r>
@@ -4784,7 +5536,7 @@
           <p:nvPr/>
         </p:nvPicPr>
         <p:blipFill>
-          <a:blip r:embed="rId2"/>
+          <a:blip r:embed="rId3"/>
           <a:stretch>
             <a:fillRect/>
           </a:stretch>
@@ -4827,7 +5579,7 @@
             </a:r>
             <a:r>
               <a:rPr lang="en-US" sz="1000">
-                <a:hlinkClick r:id="rId3"/>
+                <a:hlinkClick r:id="rId4"/>
               </a:rPr>
               <a:t>http://www.scholarpedia.org/article/Gestalt_principles</a:t>
             </a:r>
@@ -4952,7 +5704,7 @@
           <p:nvPr/>
         </p:nvPicPr>
         <p:blipFill>
-          <a:blip r:embed="rId2"/>
+          <a:blip r:embed="rId3"/>
           <a:stretch>
             <a:fillRect/>
           </a:stretch>
@@ -4995,7 +5747,7 @@
             </a:r>
             <a:r>
               <a:rPr lang="en-US" sz="1000">
-                <a:hlinkClick r:id="rId3"/>
+                <a:hlinkClick r:id="rId4"/>
               </a:rPr>
               <a:t>http://www.scholarpedia.org/article/Gestalt_principles</a:t>
             </a:r>
@@ -5102,7 +5854,7 @@
           <p:nvPr/>
         </p:nvPicPr>
         <p:blipFill>
-          <a:blip r:embed="rId4"/>
+          <a:blip r:embed="rId5"/>
           <a:stretch>
             <a:fillRect/>
           </a:stretch>
@@ -5126,7 +5878,7 @@
           <p:nvPr/>
         </p:nvPicPr>
         <p:blipFill>
-          <a:blip r:embed="rId5"/>
+          <a:blip r:embed="rId6"/>
           <a:stretch>
             <a:fillRect/>
           </a:stretch>
@@ -5223,7 +5975,7 @@
           <a:p>
             <a:r>
               <a:rPr lang="en-US" dirty="0"/>
-              <a:t>Similarity Example</a:t>
+              <a:t>Which Gestalts are present?</a:t>
             </a:r>
           </a:p>
         </p:txBody>
@@ -8572,7 +9324,7 @@
           <p:nvPr/>
         </p:nvPicPr>
         <p:blipFill>
-          <a:blip r:embed="rId2"/>
+          <a:blip r:embed="rId3"/>
           <a:stretch>
             <a:fillRect/>
           </a:stretch>
@@ -9619,7 +10371,7 @@
 </file>
 
 <file path=ppt/slides/slide6.xml><?xml version="1.0" encoding="utf-8"?>
-<p:sld xmlns:a="http://schemas.openxmlformats.org/drawingml/2006/main" xmlns:r="http://schemas.openxmlformats.org/officeDocument/2006/relationships" xmlns:p="http://schemas.openxmlformats.org/presentationml/2006/main">
+<p:sld xmlns:a="http://schemas.openxmlformats.org/drawingml/2006/main" xmlns:r="http://schemas.openxmlformats.org/officeDocument/2006/relationships" xmlns:p="http://schemas.openxmlformats.org/presentationml/2006/main" show="0">
   <p:cSld>
     <p:spTree>
       <p:nvGrpSpPr>

</xml_diff>